<commit_message>
Callback to main process continued
1) Command, response, and callback queues all belonging to
mutiprocesscoderunner in main process.
2) Better termination of everything when restarting codeprocess
3) threadId saved in thread
4) gv, lv defined in createThread instead of executeCode
5) order of parameters changed in several functions of codeThread and
codeRunner
</commit_message>
<xml_diff>
--- a/application/ide/coderun/architecture_coderunner.pptx
+++ b/application/ide/coderun/architecture_coderunner.pptx
@@ -105,6 +105,11 @@
       </a:defRPr>
     </a:lvl9pPr>
   </p:defaultTextStyle>
+  <p:extLst>
+    <p:ext uri="{EFAFB233-063F-42B5-8137-9DF3F51BA10A}">
+      <p15:sldGuideLst xmlns:p15="http://schemas.microsoft.com/office/powerpoint/2012/main"/>
+    </p:ext>
+  </p:extLst>
 </p:presentation>
 </file>
 
@@ -239,7 +244,7 @@
           <a:p>
             <a:fld id="{29E6F834-4839-42FE-9F8F-44B597CA847C}" type="datetimeFigureOut">
               <a:rPr lang="fr-FR" smtClean="0"/>
-              <a:t>22/07/2016</a:t>
+              <a:t>27/07/2016</a:t>
             </a:fld>
             <a:endParaRPr lang="fr-FR"/>
           </a:p>
@@ -409,7 +414,7 @@
           <a:p>
             <a:fld id="{29E6F834-4839-42FE-9F8F-44B597CA847C}" type="datetimeFigureOut">
               <a:rPr lang="fr-FR" smtClean="0"/>
-              <a:t>22/07/2016</a:t>
+              <a:t>27/07/2016</a:t>
             </a:fld>
             <a:endParaRPr lang="fr-FR"/>
           </a:p>
@@ -589,7 +594,7 @@
           <a:p>
             <a:fld id="{29E6F834-4839-42FE-9F8F-44B597CA847C}" type="datetimeFigureOut">
               <a:rPr lang="fr-FR" smtClean="0"/>
-              <a:t>22/07/2016</a:t>
+              <a:t>27/07/2016</a:t>
             </a:fld>
             <a:endParaRPr lang="fr-FR"/>
           </a:p>
@@ -759,7 +764,7 @@
           <a:p>
             <a:fld id="{29E6F834-4839-42FE-9F8F-44B597CA847C}" type="datetimeFigureOut">
               <a:rPr lang="fr-FR" smtClean="0"/>
-              <a:t>22/07/2016</a:t>
+              <a:t>27/07/2016</a:t>
             </a:fld>
             <a:endParaRPr lang="fr-FR"/>
           </a:p>
@@ -1005,7 +1010,7 @@
           <a:p>
             <a:fld id="{29E6F834-4839-42FE-9F8F-44B597CA847C}" type="datetimeFigureOut">
               <a:rPr lang="fr-FR" smtClean="0"/>
-              <a:t>22/07/2016</a:t>
+              <a:t>27/07/2016</a:t>
             </a:fld>
             <a:endParaRPr lang="fr-FR"/>
           </a:p>
@@ -1237,7 +1242,7 @@
           <a:p>
             <a:fld id="{29E6F834-4839-42FE-9F8F-44B597CA847C}" type="datetimeFigureOut">
               <a:rPr lang="fr-FR" smtClean="0"/>
-              <a:t>22/07/2016</a:t>
+              <a:t>27/07/2016</a:t>
             </a:fld>
             <a:endParaRPr lang="fr-FR"/>
           </a:p>
@@ -1604,7 +1609,7 @@
           <a:p>
             <a:fld id="{29E6F834-4839-42FE-9F8F-44B597CA847C}" type="datetimeFigureOut">
               <a:rPr lang="fr-FR" smtClean="0"/>
-              <a:t>22/07/2016</a:t>
+              <a:t>27/07/2016</a:t>
             </a:fld>
             <a:endParaRPr lang="fr-FR"/>
           </a:p>
@@ -1722,7 +1727,7 @@
           <a:p>
             <a:fld id="{29E6F834-4839-42FE-9F8F-44B597CA847C}" type="datetimeFigureOut">
               <a:rPr lang="fr-FR" smtClean="0"/>
-              <a:t>22/07/2016</a:t>
+              <a:t>27/07/2016</a:t>
             </a:fld>
             <a:endParaRPr lang="fr-FR"/>
           </a:p>
@@ -1817,7 +1822,7 @@
           <a:p>
             <a:fld id="{29E6F834-4839-42FE-9F8F-44B597CA847C}" type="datetimeFigureOut">
               <a:rPr lang="fr-FR" smtClean="0"/>
-              <a:t>22/07/2016</a:t>
+              <a:t>27/07/2016</a:t>
             </a:fld>
             <a:endParaRPr lang="fr-FR"/>
           </a:p>
@@ -2094,7 +2099,7 @@
           <a:p>
             <a:fld id="{29E6F834-4839-42FE-9F8F-44B597CA847C}" type="datetimeFigureOut">
               <a:rPr lang="fr-FR" smtClean="0"/>
-              <a:t>22/07/2016</a:t>
+              <a:t>27/07/2016</a:t>
             </a:fld>
             <a:endParaRPr lang="fr-FR"/>
           </a:p>
@@ -2347,7 +2352,7 @@
           <a:p>
             <a:fld id="{29E6F834-4839-42FE-9F8F-44B597CA847C}" type="datetimeFigureOut">
               <a:rPr lang="fr-FR" smtClean="0"/>
-              <a:t>22/07/2016</a:t>
+              <a:t>27/07/2016</a:t>
             </a:fld>
             <a:endParaRPr lang="fr-FR"/>
           </a:p>
@@ -2560,7 +2565,7 @@
           <a:p>
             <a:fld id="{29E6F834-4839-42FE-9F8F-44B597CA847C}" type="datetimeFigureOut">
               <a:rPr lang="fr-FR" smtClean="0"/>
-              <a:t>22/07/2016</a:t>
+              <a:t>27/07/2016</a:t>
             </a:fld>
             <a:endParaRPr lang="fr-FR"/>
           </a:p>
@@ -3763,15 +3768,7 @@
                     <a:srgbClr val="006600"/>
                   </a:solidFill>
                 </a:rPr>
-                <a:t>      </a:t>
-              </a:r>
-              <a:r>
-                <a:rPr lang="fr-FR" sz="1200" dirty="0" smtClean="0">
-                  <a:solidFill>
-                    <a:srgbClr val="006600"/>
-                  </a:solidFill>
-                </a:rPr>
-                <a:t>_</a:t>
+                <a:t>      _</a:t>
               </a:r>
               <a:r>
                 <a:rPr lang="fr-FR" sz="1200" dirty="0" err="1" smtClean="0">
@@ -5005,6 +5002,36 @@
           </a:fontRef>
         </p:style>
       </p:cxnSp>
+      <p:sp>
+        <p:nvSpPr>
+          <p:cNvPr id="2" name="ZoneTexte 1"/>
+          <p:cNvSpPr txBox="1"/>
+          <p:nvPr/>
+        </p:nvSpPr>
+        <p:spPr>
+          <a:xfrm>
+            <a:off x="723900" y="4461863"/>
+            <a:ext cx="652743" cy="369332"/>
+          </a:xfrm>
+          <a:prstGeom prst="rect">
+            <a:avLst/>
+          </a:prstGeom>
+          <a:noFill/>
+        </p:spPr>
+        <p:txBody>
+          <a:bodyPr wrap="none" rtlCol="0">
+            <a:spAutoFit/>
+          </a:bodyPr>
+          <a:lstStyle/>
+          <a:p>
+            <a:r>
+              <a:rPr lang="fr-FR" b="1" dirty="0" smtClean="0"/>
+              <a:t>2014</a:t>
+            </a:r>
+            <a:endParaRPr lang="fr-FR" b="1" dirty="0"/>
+          </a:p>
+        </p:txBody>
+      </p:sp>
     </p:spTree>
     <p:extLst>
       <p:ext uri="{BB962C8B-B14F-4D97-AF65-F5344CB8AC3E}">
@@ -5101,7 +5128,7 @@
         <p:spPr>
           <a:xfrm>
             <a:off x="104501" y="69666"/>
-            <a:ext cx="2746649" cy="338554"/>
+            <a:ext cx="2346220" cy="338554"/>
           </a:xfrm>
           <a:prstGeom prst="rect">
             <a:avLst/>
@@ -5115,12 +5142,12 @@
           <a:lstStyle/>
           <a:p>
             <a:r>
-              <a:rPr lang="fr-FR" sz="1600" b="1" dirty="0" smtClean="0">
+              <a:rPr lang="fr-FR" sz="1600" b="1" dirty="0" err="1" smtClean="0">
                 <a:solidFill>
                   <a:srgbClr val="0000FF"/>
                 </a:solidFill>
               </a:rPr>
-              <a:t>MULTIPROCESS CODERUNNER</a:t>
+              <a:t>MultiprocessCodeRunner</a:t>
             </a:r>
             <a:endParaRPr lang="fr-FR" sz="1600" b="1" dirty="0">
               <a:solidFill>
@@ -5139,7 +5166,7 @@
         <p:spPr>
           <a:xfrm>
             <a:off x="104501" y="357048"/>
-            <a:ext cx="1792350" cy="307777"/>
+            <a:ext cx="2820965" cy="954107"/>
           </a:xfrm>
           <a:prstGeom prst="rect">
             <a:avLst/>
@@ -5184,6 +5211,102 @@
               </a:rPr>
               <a:t>codeProcess</a:t>
             </a:r>
+            <a:endParaRPr lang="fr-FR" sz="1400" dirty="0" smtClean="0">
+              <a:solidFill>
+                <a:srgbClr val="0000FF"/>
+              </a:solidFill>
+            </a:endParaRPr>
+          </a:p>
+          <a:p>
+            <a:r>
+              <a:rPr lang="fr-FR" sz="1400" b="1" dirty="0">
+                <a:solidFill>
+                  <a:srgbClr val="0000FF"/>
+                </a:solidFill>
+              </a:rPr>
+              <a:t>_</a:t>
+            </a:r>
+            <a:r>
+              <a:rPr lang="fr-FR" sz="1400" b="1" dirty="0" err="1" smtClean="0">
+                <a:solidFill>
+                  <a:srgbClr val="0000FF"/>
+                </a:solidFill>
+              </a:rPr>
+              <a:t>callbackQueue</a:t>
+            </a:r>
+            <a:r>
+              <a:rPr lang="fr-FR" sz="1400" b="1" dirty="0">
+                <a:solidFill>
+                  <a:srgbClr val="0000FF"/>
+                </a:solidFill>
+              </a:rPr>
+              <a:t>, _</a:t>
+            </a:r>
+            <a:r>
+              <a:rPr lang="fr-FR" sz="1400" b="1" dirty="0" err="1">
+                <a:solidFill>
+                  <a:srgbClr val="0000FF"/>
+                </a:solidFill>
+              </a:rPr>
+              <a:t>callbackDict</a:t>
+            </a:r>
+            <a:r>
+              <a:rPr lang="fr-FR" sz="1400" b="1" dirty="0">
+                <a:solidFill>
+                  <a:srgbClr val="0000FF"/>
+                </a:solidFill>
+              </a:rPr>
+              <a:t> = </a:t>
+            </a:r>
+            <a:r>
+              <a:rPr lang="fr-FR" sz="1400" b="1" dirty="0" smtClean="0">
+                <a:solidFill>
+                  <a:srgbClr val="0000FF"/>
+                </a:solidFill>
+              </a:rPr>
+              <a:t>{}</a:t>
+            </a:r>
+          </a:p>
+          <a:p>
+            <a:r>
+              <a:rPr lang="fr-FR" sz="1400" dirty="0">
+                <a:solidFill>
+                  <a:srgbClr val="006600"/>
+                </a:solidFill>
+              </a:rPr>
+              <a:t>_</a:t>
+            </a:r>
+            <a:r>
+              <a:rPr lang="fr-FR" sz="1400" dirty="0" err="1">
+                <a:solidFill>
+                  <a:srgbClr val="006600"/>
+                </a:solidFill>
+              </a:rPr>
+              <a:t>commandQueue</a:t>
+            </a:r>
+            <a:r>
+              <a:rPr lang="fr-FR" sz="1400" dirty="0">
+                <a:solidFill>
+                  <a:srgbClr val="006600"/>
+                </a:solidFill>
+              </a:rPr>
+              <a:t>, _</a:t>
+            </a:r>
+            <a:r>
+              <a:rPr lang="fr-FR" sz="1400" dirty="0" err="1">
+                <a:solidFill>
+                  <a:srgbClr val="006600"/>
+                </a:solidFill>
+              </a:rPr>
+              <a:t>responseQueue</a:t>
+            </a:r>
+            <a:endParaRPr lang="fr-FR" sz="1400" b="1" dirty="0" smtClean="0">
+              <a:solidFill>
+                <a:srgbClr val="0000FF"/>
+              </a:solidFill>
+            </a:endParaRPr>
+          </a:p>
+          <a:p>
             <a:endParaRPr lang="fr-FR" sz="1400" dirty="0">
               <a:solidFill>
                 <a:srgbClr val="0000FF"/>
@@ -5200,8 +5323,8 @@
         </p:nvSpPr>
         <p:spPr>
           <a:xfrm>
-            <a:off x="104501" y="695602"/>
-            <a:ext cx="3420680" cy="1323439"/>
+            <a:off x="104501" y="1038502"/>
+            <a:ext cx="3459345" cy="1938992"/>
           </a:xfrm>
           <a:prstGeom prst="rect">
             <a:avLst/>
@@ -5233,6 +5356,108 @@
           </a:p>
           <a:p>
             <a:r>
+              <a:rPr lang="fr-FR" sz="1200" dirty="0">
+                <a:solidFill>
+                  <a:srgbClr val="0000FF"/>
+                </a:solidFill>
+              </a:rPr>
+              <a:t> </a:t>
+            </a:r>
+            <a:r>
+              <a:rPr lang="fr-FR" sz="1200" dirty="0" smtClean="0">
+                <a:solidFill>
+                  <a:srgbClr val="0000FF"/>
+                </a:solidFill>
+              </a:rPr>
+              <a:t>   _</a:t>
+            </a:r>
+            <a:r>
+              <a:rPr lang="fr-FR" sz="1200" dirty="0" err="1" smtClean="0">
+                <a:solidFill>
+                  <a:srgbClr val="0000FF"/>
+                </a:solidFill>
+              </a:rPr>
+              <a:t>codeProcess</a:t>
+            </a:r>
+            <a:r>
+              <a:rPr lang="fr-FR" sz="1200" dirty="0" smtClean="0">
+                <a:solidFill>
+                  <a:srgbClr val="0000FF"/>
+                </a:solidFill>
+              </a:rPr>
+              <a:t> </a:t>
+            </a:r>
+            <a:r>
+              <a:rPr lang="fr-FR" sz="1200" dirty="0">
+                <a:solidFill>
+                  <a:srgbClr val="0000FF"/>
+                </a:solidFill>
+              </a:rPr>
+              <a:t>= </a:t>
+            </a:r>
+            <a:r>
+              <a:rPr lang="fr-FR" sz="1200" dirty="0" err="1">
+                <a:solidFill>
+                  <a:srgbClr val="0000FF"/>
+                </a:solidFill>
+              </a:rPr>
+              <a:t>CodeProcess</a:t>
+            </a:r>
+            <a:r>
+              <a:rPr lang="fr-FR" sz="1200" dirty="0" smtClean="0">
+                <a:solidFill>
+                  <a:srgbClr val="0000FF"/>
+                </a:solidFill>
+              </a:rPr>
+              <a:t>(_</a:t>
+            </a:r>
+            <a:r>
+              <a:rPr lang="fr-FR" sz="1200" dirty="0" err="1">
+                <a:solidFill>
+                  <a:srgbClr val="0000FF"/>
+                </a:solidFill>
+              </a:rPr>
+              <a:t>gv</a:t>
+            </a:r>
+            <a:r>
+              <a:rPr lang="fr-FR" sz="1200" dirty="0" smtClean="0">
+                <a:solidFill>
+                  <a:srgbClr val="0000FF"/>
+                </a:solidFill>
+              </a:rPr>
+              <a:t>,_</a:t>
+            </a:r>
+            <a:r>
+              <a:rPr lang="fr-FR" sz="1200" dirty="0" err="1">
+                <a:solidFill>
+                  <a:srgbClr val="0000FF"/>
+                </a:solidFill>
+              </a:rPr>
+              <a:t>callbackQueue</a:t>
+            </a:r>
+            <a:r>
+              <a:rPr lang="fr-FR" sz="1200" dirty="0">
+                <a:solidFill>
+                  <a:srgbClr val="0000FF"/>
+                </a:solidFill>
+              </a:rPr>
+              <a:t>)</a:t>
+            </a:r>
+            <a:endParaRPr lang="fr-FR" sz="1200" dirty="0" smtClean="0">
+              <a:solidFill>
+                <a:srgbClr val="0000FF"/>
+              </a:solidFill>
+            </a:endParaRPr>
+          </a:p>
+          <a:p>
+            <a:endParaRPr lang="fr-FR" sz="1400" dirty="0" smtClean="0">
+              <a:solidFill>
+                <a:srgbClr val="0000FF"/>
+              </a:solidFill>
+            </a:endParaRPr>
+          </a:p>
+          <a:p>
+            <a:r>
               <a:rPr lang="fr-FR" sz="1400" dirty="0" err="1" smtClean="0">
                 <a:solidFill>
                   <a:srgbClr val="0000FF"/>
@@ -5250,6 +5475,13 @@
             </a:r>
           </a:p>
           <a:p>
+            <a:endParaRPr lang="fr-FR" sz="1400" dirty="0" smtClean="0">
+              <a:solidFill>
+                <a:srgbClr val="0000FF"/>
+              </a:solidFill>
+            </a:endParaRPr>
+          </a:p>
+          <a:p>
             <a:r>
               <a:rPr lang="fr-FR" sz="1400" dirty="0" err="1" smtClean="0">
                 <a:solidFill>
@@ -5264,7 +5496,15 @@
                   <a:srgbClr val="0000FF"/>
                 </a:solidFill>
               </a:rPr>
-              <a:t>(command,*</a:t>
+              <a:t>(command</a:t>
+            </a:r>
+            <a:r>
+              <a:rPr lang="fr-FR" sz="1400" dirty="0" smtClean="0">
+                <a:solidFill>
+                  <a:srgbClr val="0000FF"/>
+                </a:solidFill>
+              </a:rPr>
+              <a:t>,*</a:t>
             </a:r>
             <a:r>
               <a:rPr lang="fr-FR" sz="1400" dirty="0" err="1" smtClean="0">
@@ -5422,7 +5662,15 @@
                   <a:srgbClr val="006600"/>
                 </a:solidFill>
               </a:rPr>
-              <a:t>(timeout)</a:t>
+              <a:t>(timeout</a:t>
+            </a:r>
+            <a:r>
+              <a:rPr lang="fr-FR" sz="1200" dirty="0" smtClean="0">
+                <a:solidFill>
+                  <a:srgbClr val="006600"/>
+                </a:solidFill>
+              </a:rPr>
+              <a:t>)</a:t>
             </a:r>
           </a:p>
         </p:txBody>
@@ -5435,8 +5683,8 @@
         </p:nvGrpSpPr>
         <p:grpSpPr>
           <a:xfrm>
-            <a:off x="3544382" y="345885"/>
-            <a:ext cx="8038017" cy="6220378"/>
+            <a:off x="3544379" y="345885"/>
+            <a:ext cx="8038015" cy="6220378"/>
             <a:chOff x="3979817" y="955484"/>
             <a:chExt cx="5547364" cy="6220378"/>
           </a:xfrm>
@@ -5496,7 +5744,7 @@
           <p:spPr>
             <a:xfrm>
               <a:off x="3979817" y="955484"/>
-              <a:ext cx="1471237" cy="338554"/>
+              <a:ext cx="870258" cy="338554"/>
             </a:xfrm>
             <a:prstGeom prst="rect">
               <a:avLst/>
@@ -5510,12 +5758,12 @@
             <a:lstStyle/>
             <a:p>
               <a:r>
-                <a:rPr lang="fr-FR" sz="1600" b="1" dirty="0" smtClean="0">
+                <a:rPr lang="fr-FR" sz="1600" b="1" dirty="0" err="1" smtClean="0">
                   <a:solidFill>
                     <a:srgbClr val="006600"/>
                   </a:solidFill>
                 </a:rPr>
-                <a:t>CODE PROCESS</a:t>
+                <a:t>CodeProcess</a:t>
               </a:r>
               <a:endParaRPr lang="fr-FR" sz="1600" b="1" dirty="0">
                 <a:solidFill>
@@ -5534,7 +5782,7 @@
           <p:spPr>
             <a:xfrm>
               <a:off x="3979817" y="1215809"/>
-              <a:ext cx="3976858" cy="738664"/>
+              <a:ext cx="2400047" cy="738664"/>
             </a:xfrm>
             <a:prstGeom prst="rect">
               <a:avLst/>
@@ -5571,59 +5819,67 @@
                 </a:rPr>
                 <a:t>, _lv, </a:t>
               </a:r>
+              <a:r>
+                <a:rPr lang="fr-FR" sz="1400" dirty="0" smtClean="0">
+                  <a:solidFill>
+                    <a:srgbClr val="006600"/>
+                  </a:solidFill>
+                </a:rPr>
+                <a:t>_</a:t>
+              </a:r>
+              <a:r>
+                <a:rPr lang="fr-FR" sz="1400" dirty="0" err="1" smtClean="0">
+                  <a:solidFill>
+                    <a:srgbClr val="006600"/>
+                  </a:solidFill>
+                </a:rPr>
+                <a:t>commandQueue</a:t>
+              </a:r>
+              <a:r>
+                <a:rPr lang="fr-FR" sz="1400" dirty="0" smtClean="0">
+                  <a:solidFill>
+                    <a:srgbClr val="006600"/>
+                  </a:solidFill>
+                </a:rPr>
+                <a:t>, _</a:t>
+              </a:r>
+              <a:r>
+                <a:rPr lang="fr-FR" sz="1400" dirty="0" err="1" smtClean="0">
+                  <a:solidFill>
+                    <a:srgbClr val="006600"/>
+                  </a:solidFill>
+                </a:rPr>
+                <a:t>responseQueue</a:t>
+              </a:r>
+              <a:r>
+                <a:rPr lang="fr-FR" sz="1400" dirty="0" smtClean="0">
+                  <a:solidFill>
+                    <a:srgbClr val="006600"/>
+                  </a:solidFill>
+                </a:rPr>
+                <a:t>,</a:t>
+              </a:r>
             </a:p>
             <a:p>
               <a:r>
-                <a:rPr lang="fr-FR" sz="1400" dirty="0" smtClean="0">
-                  <a:solidFill>
-                    <a:srgbClr val="006600"/>
-                  </a:solidFill>
-                </a:rPr>
-                <a:t>_</a:t>
-              </a:r>
-              <a:r>
-                <a:rPr lang="fr-FR" sz="1400" dirty="0" err="1" smtClean="0">
-                  <a:solidFill>
-                    <a:srgbClr val="006600"/>
-                  </a:solidFill>
-                </a:rPr>
-                <a:t>commandQueue</a:t>
-              </a:r>
-              <a:r>
-                <a:rPr lang="fr-FR" sz="1400" dirty="0" smtClean="0">
-                  <a:solidFill>
-                    <a:srgbClr val="006600"/>
-                  </a:solidFill>
-                </a:rPr>
-                <a:t>, _</a:t>
-              </a:r>
-              <a:r>
-                <a:rPr lang="fr-FR" sz="1400" dirty="0" err="1" smtClean="0">
-                  <a:solidFill>
-                    <a:srgbClr val="006600"/>
-                  </a:solidFill>
-                </a:rPr>
-                <a:t>responseQueue</a:t>
-              </a:r>
-              <a:r>
-                <a:rPr lang="fr-FR" sz="1400" dirty="0" smtClean="0">
-                  <a:solidFill>
-                    <a:srgbClr val="006600"/>
-                  </a:solidFill>
-                </a:rPr>
-                <a:t>, </a:t>
-              </a:r>
-              <a:r>
-                <a:rPr lang="fr-FR" sz="1400" dirty="0" err="1" smtClean="0">
-                  <a:solidFill>
-                    <a:srgbClr val="FF00FF"/>
+                <a:rPr lang="fr-FR" sz="1400" b="1" dirty="0" err="1">
+                  <a:solidFill>
+                    <a:srgbClr val="0000FF"/>
                   </a:solidFill>
                 </a:rPr>
                 <a:t>callbackQueue</a:t>
               </a:r>
-              <a:endParaRPr lang="fr-FR" sz="1400" dirty="0" smtClean="0">
-                <a:solidFill>
-                  <a:srgbClr val="FF00FF"/>
+              <a:r>
+                <a:rPr lang="fr-FR" sz="1400" b="1" dirty="0">
+                  <a:solidFill>
+                    <a:srgbClr val="0000FF"/>
+                  </a:solidFill>
+                </a:rPr>
+                <a:t> </a:t>
+              </a:r>
+              <a:endParaRPr lang="fr-FR" sz="1400" b="1" dirty="0">
+                <a:solidFill>
+                  <a:srgbClr val="006600"/>
                 </a:solidFill>
               </a:endParaRPr>
             </a:p>
@@ -5631,20 +5887,28 @@
               <a:r>
                 <a:rPr lang="fr-FR" sz="1400" dirty="0" smtClean="0">
                   <a:solidFill>
+                    <a:srgbClr val="FF0000"/>
+                  </a:solidFill>
+                </a:rPr>
+                <a:t>_</a:t>
+              </a:r>
+              <a:r>
+                <a:rPr lang="fr-FR" sz="1400" dirty="0" err="1" smtClean="0">
+                  <a:solidFill>
+                    <a:srgbClr val="FF0000"/>
+                  </a:solidFill>
+                </a:rPr>
+                <a:t>codeRunner</a:t>
+              </a:r>
+              <a:r>
+                <a:rPr lang="fr-FR" sz="1400" dirty="0" smtClean="0">
+                  <a:solidFill>
                     <a:srgbClr val="006600"/>
                   </a:solidFill>
                 </a:rPr>
-                <a:t>_</a:t>
-              </a:r>
-              <a:r>
-                <a:rPr lang="fr-FR" sz="1400" dirty="0" err="1" smtClean="0">
-                  <a:solidFill>
-                    <a:srgbClr val="006600"/>
-                  </a:solidFill>
-                </a:rPr>
-                <a:t>codeRunner</a:t>
-              </a:r>
-              <a:endParaRPr lang="fr-FR" sz="1400" dirty="0">
+                <a:t>, </a:t>
+              </a:r>
+              <a:endParaRPr lang="fr-FR" sz="1400" b="1" dirty="0">
                 <a:solidFill>
                   <a:srgbClr val="006600"/>
                 </a:solidFill>
@@ -5660,8 +5924,8 @@
           </p:nvSpPr>
           <p:spPr>
             <a:xfrm>
-              <a:off x="3979817" y="2060541"/>
-              <a:ext cx="2955937" cy="1261884"/>
+              <a:off x="3981041" y="2015722"/>
+              <a:ext cx="2275445" cy="1261884"/>
             </a:xfrm>
             <a:prstGeom prst="rect">
               <a:avLst/>
@@ -5669,7 +5933,7 @@
             <a:noFill/>
           </p:spPr>
           <p:txBody>
-            <a:bodyPr wrap="none" rtlCol="0">
+            <a:bodyPr wrap="square" rtlCol="0">
               <a:spAutoFit/>
             </a:bodyPr>
             <a:lstStyle/>
@@ -5856,15 +6120,7 @@
                     <a:srgbClr val="006600"/>
                   </a:solidFill>
                 </a:rPr>
-                <a:t>      </a:t>
-              </a:r>
-              <a:r>
-                <a:rPr lang="fr-FR" sz="1200" dirty="0" smtClean="0">
-                  <a:solidFill>
-                    <a:srgbClr val="006600"/>
-                  </a:solidFill>
-                </a:rPr>
-                <a:t>_</a:t>
+                <a:t>      _</a:t>
               </a:r>
               <a:r>
                 <a:rPr lang="fr-FR" sz="1200" dirty="0" err="1" smtClean="0">
@@ -5938,9 +6194,9 @@
         <p:grpSpPr>
           <a:xfrm>
             <a:off x="3666307" y="2659095"/>
-            <a:ext cx="3519812" cy="4111093"/>
+            <a:ext cx="3519812" cy="3895649"/>
             <a:chOff x="3866606" y="960919"/>
-            <a:chExt cx="3519812" cy="4111093"/>
+            <a:chExt cx="3519812" cy="3895649"/>
           </a:xfrm>
         </p:grpSpPr>
         <p:sp>
@@ -5998,7 +6254,7 @@
           <p:spPr>
             <a:xfrm>
               <a:off x="3875309" y="964193"/>
-              <a:ext cx="1441548" cy="338554"/>
+              <a:ext cx="1241045" cy="338554"/>
             </a:xfrm>
             <a:prstGeom prst="rect">
               <a:avLst/>
@@ -6012,12 +6268,12 @@
             <a:lstStyle/>
             <a:p>
               <a:r>
-                <a:rPr lang="fr-FR" sz="1600" b="1" dirty="0" smtClean="0">
+                <a:rPr lang="fr-FR" sz="1600" b="1" dirty="0" err="1" smtClean="0">
                   <a:solidFill>
                     <a:srgbClr val="FF0000"/>
                   </a:solidFill>
                 </a:rPr>
-                <a:t>CODE RUNNER</a:t>
+                <a:t>CodeRunner</a:t>
               </a:r>
               <a:endParaRPr lang="fr-FR" sz="1600" b="1" dirty="0">
                 <a:solidFill>
@@ -6036,7 +6292,7 @@
           <p:spPr>
             <a:xfrm>
               <a:off x="3979817" y="1268063"/>
-              <a:ext cx="2050561" cy="523220"/>
+              <a:ext cx="3354060" cy="523220"/>
             </a:xfrm>
             <a:prstGeom prst="rect">
               <a:avLst/>
@@ -6071,27 +6327,48 @@
                     <a:srgbClr val="FF0000"/>
                   </a:solidFill>
                 </a:rPr>
-                <a:t>, _lv, _threads,</a:t>
-              </a:r>
+                <a:t>, _lv, _threads</a:t>
+              </a:r>
+              <a:r>
+                <a:rPr lang="fr-FR" sz="1400" dirty="0" smtClean="0">
+                  <a:solidFill>
+                    <a:srgbClr val="FF0000"/>
+                  </a:solidFill>
+                </a:rPr>
+                <a:t>, _</a:t>
+              </a:r>
+              <a:r>
+                <a:rPr lang="fr-FR" sz="1400" dirty="0" smtClean="0">
+                  <a:solidFill>
+                    <a:srgbClr val="FF0000"/>
+                  </a:solidFill>
+                </a:rPr>
+                <a:t>exceptions, _</a:t>
+              </a:r>
+              <a:r>
+                <a:rPr lang="fr-FR" sz="1400" dirty="0" err="1" smtClean="0">
+                  <a:solidFill>
+                    <a:srgbClr val="FF0000"/>
+                  </a:solidFill>
+                </a:rPr>
+                <a:t>tracebacks</a:t>
+              </a:r>
+              <a:endParaRPr lang="fr-FR" sz="1400" dirty="0" smtClean="0">
+                <a:solidFill>
+                  <a:srgbClr val="FF0000"/>
+                </a:solidFill>
+              </a:endParaRPr>
             </a:p>
             <a:p>
               <a:r>
-                <a:rPr lang="fr-FR" sz="1400" dirty="0" smtClean="0">
-                  <a:solidFill>
-                    <a:srgbClr val="FF0000"/>
-                  </a:solidFill>
-                </a:rPr>
-                <a:t> _exceptions, _</a:t>
-              </a:r>
-              <a:r>
-                <a:rPr lang="fr-FR" sz="1400" dirty="0" err="1" smtClean="0">
-                  <a:solidFill>
-                    <a:srgbClr val="FF0000"/>
-                  </a:solidFill>
-                </a:rPr>
-                <a:t>tracebacks</a:t>
-              </a:r>
-              <a:endParaRPr lang="fr-FR" sz="1400" dirty="0" smtClean="0">
+                <a:rPr lang="fr-FR" sz="1400" b="1" dirty="0" err="1">
+                  <a:solidFill>
+                    <a:srgbClr val="0000FF"/>
+                  </a:solidFill>
+                </a:rPr>
+                <a:t>callbackQueue</a:t>
+              </a:r>
+              <a:endParaRPr lang="fr-FR" sz="1400" b="1" dirty="0" smtClean="0">
                 <a:solidFill>
                   <a:srgbClr val="FF0000"/>
                 </a:solidFill>
@@ -6108,7 +6385,7 @@
           <p:spPr>
             <a:xfrm>
               <a:off x="3979817" y="1748025"/>
-              <a:ext cx="3139577" cy="3323987"/>
+              <a:ext cx="3165867" cy="3108543"/>
             </a:xfrm>
             <a:prstGeom prst="rect">
               <a:avLst/>
@@ -6121,49 +6398,7 @@
             </a:bodyPr>
             <a:lstStyle/>
             <a:p>
-              <a:r>
-                <a:rPr lang="fr-FR" sz="1400" dirty="0" err="1">
-                  <a:solidFill>
-                    <a:srgbClr val="FF0000"/>
-                  </a:solidFill>
-                </a:rPr>
-                <a:t>i</a:t>
-              </a:r>
-              <a:r>
-                <a:rPr lang="fr-FR" sz="1400" dirty="0" err="1" smtClean="0">
-                  <a:solidFill>
-                    <a:srgbClr val="FF0000"/>
-                  </a:solidFill>
-                </a:rPr>
-                <a:t>nit</a:t>
-              </a:r>
-              <a:r>
-                <a:rPr lang="fr-FR" sz="1400" dirty="0" smtClean="0">
-                  <a:solidFill>
-                    <a:srgbClr val="FF0000"/>
-                  </a:solidFill>
-                </a:rPr>
-                <a:t> (</a:t>
-              </a:r>
-              <a:r>
-                <a:rPr lang="fr-FR" sz="1400" dirty="0" err="1" smtClean="0">
-                  <a:solidFill>
-                    <a:srgbClr val="FF00FF"/>
-                  </a:solidFill>
-                </a:rPr>
-                <a:t>callbackQueue</a:t>
-              </a:r>
-              <a:r>
-                <a:rPr lang="fr-FR" sz="1400" dirty="0" smtClean="0">
-                  <a:solidFill>
-                    <a:srgbClr val="FF0000"/>
-                  </a:solidFill>
-                </a:rPr>
-                <a:t>)</a:t>
-              </a:r>
-            </a:p>
-            <a:p>
-              <a:endParaRPr lang="fr-FR" sz="1400" dirty="0">
+              <a:endParaRPr lang="fr-FR" sz="1400" dirty="0" smtClean="0">
                 <a:solidFill>
                   <a:srgbClr val="FF0000"/>
                 </a:solidFill>
@@ -6284,11 +6519,7 @@
                 <a:t>(code, </a:t>
               </a:r>
               <a:r>
-                <a:rPr lang="fr-FR" sz="1200" dirty="0" err="1" smtClean="0">
-                  <a:solidFill>
-                    <a:srgbClr val="FF00FF"/>
-                  </a:solidFill>
-                </a:rPr>
+                <a:rPr lang="fr-FR" sz="1200" b="1" dirty="0" err="1" smtClean="0"/>
                 <a:t>resultExpression</a:t>
               </a:r>
               <a:r>
@@ -6329,11 +6560,7 @@
                 <a:t>(self, </a:t>
               </a:r>
               <a:r>
-                <a:rPr lang="fr-FR" sz="1400" dirty="0" err="1" smtClean="0">
-                  <a:solidFill>
-                    <a:srgbClr val="FF00FF"/>
-                  </a:solidFill>
-                </a:rPr>
+                <a:rPr lang="fr-FR" sz="1400" b="1" dirty="0" err="1" smtClean="0"/>
                 <a:t>result</a:t>
               </a:r>
               <a:r>
@@ -6357,7 +6584,7 @@
               <a:r>
                 <a:rPr lang="en-US" sz="1200" dirty="0" smtClean="0">
                   <a:solidFill>
-                    <a:srgbClr val="FF00FF"/>
+                    <a:srgbClr val="0000FF"/>
                   </a:solidFill>
                 </a:rPr>
                 <a:t>_</a:t>
@@ -6365,7 +6592,7 @@
               <a:r>
                 <a:rPr lang="en-US" sz="1200" dirty="0" err="1" smtClean="0">
                   <a:solidFill>
-                    <a:srgbClr val="FF00FF"/>
+                    <a:srgbClr val="0000FF"/>
                   </a:solidFill>
                 </a:rPr>
                 <a:t>callbackQueue</a:t>
@@ -6387,11 +6614,7 @@
                 <a:t>((id, failed, </a:t>
               </a:r>
               <a:r>
-                <a:rPr lang="en-US" sz="1200" dirty="0" smtClean="0">
-                  <a:solidFill>
-                    <a:srgbClr val="FF00FF"/>
-                  </a:solidFill>
-                </a:rPr>
+                <a:rPr lang="en-US" sz="1200" b="1" dirty="0" smtClean="0"/>
                 <a:t>result</a:t>
               </a:r>
               <a:r>
@@ -6473,43 +6696,6 @@
           </p:txBody>
         </p:sp>
       </p:grpSp>
-      <p:cxnSp>
-        <p:nvCxnSpPr>
-          <p:cNvPr id="23" name="Connecteur droit avec flèche 22"/>
-          <p:cNvCxnSpPr/>
-          <p:nvPr/>
-        </p:nvCxnSpPr>
-        <p:spPr>
-          <a:xfrm>
-            <a:off x="4680855" y="1210488"/>
-            <a:ext cx="1819465" cy="0"/>
-          </a:xfrm>
-          <a:prstGeom prst="straightConnector1">
-            <a:avLst/>
-          </a:prstGeom>
-          <a:ln>
-            <a:solidFill>
-              <a:srgbClr val="FF0000"/>
-            </a:solidFill>
-            <a:headEnd type="none" w="med" len="med"/>
-            <a:tailEnd type="none" w="med" len="med"/>
-          </a:ln>
-        </p:spPr>
-        <p:style>
-          <a:lnRef idx="1">
-            <a:schemeClr val="accent1"/>
-          </a:lnRef>
-          <a:fillRef idx="0">
-            <a:schemeClr val="accent1"/>
-          </a:fillRef>
-          <a:effectRef idx="0">
-            <a:schemeClr val="accent1"/>
-          </a:effectRef>
-          <a:fontRef idx="minor">
-            <a:schemeClr val="tx1"/>
-          </a:fontRef>
-        </p:style>
-      </p:cxnSp>
       <p:cxnSp>
         <p:nvCxnSpPr>
           <p:cNvPr id="27" name="Connecteur droit avec flèche 26"/>
@@ -6518,8 +6704,8 @@
         </p:nvCxnSpPr>
         <p:spPr>
           <a:xfrm>
-            <a:off x="6500320" y="1219197"/>
-            <a:ext cx="0" cy="1434463"/>
+            <a:off x="6679101" y="1240906"/>
+            <a:ext cx="0" cy="1427101"/>
           </a:xfrm>
           <a:prstGeom prst="straightConnector1">
             <a:avLst/>
@@ -6554,7 +6740,7 @@
         </p:nvGrpSpPr>
         <p:grpSpPr>
           <a:xfrm>
-            <a:off x="7927088" y="1219195"/>
+            <a:off x="7927088" y="1809745"/>
             <a:ext cx="3589993" cy="4635439"/>
             <a:chOff x="7330825" y="1515289"/>
             <a:chExt cx="3589993" cy="4635439"/>
@@ -6649,10 +6835,10 @@
         </p:nvGrpSpPr>
         <p:grpSpPr>
           <a:xfrm>
-            <a:off x="7908039" y="5959138"/>
-            <a:ext cx="3609042" cy="660259"/>
-            <a:chOff x="7330826" y="1515291"/>
-            <a:chExt cx="3609042" cy="660259"/>
+            <a:off x="7908039" y="560008"/>
+            <a:ext cx="3609042" cy="1128099"/>
+            <a:chOff x="7330826" y="763846"/>
+            <a:chExt cx="3609042" cy="1128099"/>
           </a:xfrm>
         </p:grpSpPr>
         <p:sp>
@@ -6663,7 +6849,7 @@
           </p:nvSpPr>
           <p:spPr>
             <a:xfrm>
-              <a:off x="7330826" y="1515291"/>
+              <a:off x="7330826" y="1553391"/>
               <a:ext cx="3609042" cy="329845"/>
             </a:xfrm>
             <a:prstGeom prst="rect">
@@ -6709,7 +6895,7 @@
           </p:nvSpPr>
           <p:spPr>
             <a:xfrm>
-              <a:off x="7339538" y="1515291"/>
+              <a:off x="7339538" y="1553391"/>
               <a:ext cx="1365374" cy="338554"/>
             </a:xfrm>
             <a:prstGeom prst="rect">
@@ -6737,13 +6923,13 @@
         </p:sp>
         <p:sp>
           <p:nvSpPr>
-            <p:cNvPr id="39" name="ZoneTexte 38"/>
+            <p:cNvPr id="95" name="ZoneTexte 94"/>
             <p:cNvSpPr txBox="1"/>
             <p:nvPr/>
           </p:nvSpPr>
           <p:spPr>
             <a:xfrm rot="5400000">
-              <a:off x="8256982" y="1841003"/>
+              <a:off x="7952186" y="759839"/>
               <a:ext cx="330540" cy="338554"/>
             </a:xfrm>
             <a:prstGeom prst="rect">
@@ -6766,6 +6952,90 @@
             </a:p>
           </p:txBody>
         </p:sp>
+        <p:sp>
+          <p:nvSpPr>
+            <p:cNvPr id="96" name="Rectangle 95"/>
+            <p:cNvSpPr/>
+            <p:nvPr/>
+          </p:nvSpPr>
+          <p:spPr>
+            <a:xfrm>
+              <a:off x="7330826" y="1106190"/>
+              <a:ext cx="3609042" cy="329845"/>
+            </a:xfrm>
+            <a:prstGeom prst="rect">
+              <a:avLst/>
+            </a:prstGeom>
+            <a:noFill/>
+            <a:ln>
+              <a:solidFill>
+                <a:schemeClr val="tx1"/>
+              </a:solidFill>
+            </a:ln>
+          </p:spPr>
+          <p:style>
+            <a:lnRef idx="2">
+              <a:schemeClr val="accent1">
+                <a:shade val="50000"/>
+              </a:schemeClr>
+            </a:lnRef>
+            <a:fillRef idx="1">
+              <a:schemeClr val="accent1"/>
+            </a:fillRef>
+            <a:effectRef idx="0">
+              <a:schemeClr val="accent1"/>
+            </a:effectRef>
+            <a:fontRef idx="minor">
+              <a:schemeClr val="lt1"/>
+            </a:fontRef>
+          </p:style>
+          <p:txBody>
+            <a:bodyPr rtlCol="0" anchor="ctr"/>
+            <a:lstStyle/>
+            <a:p>
+              <a:pPr algn="ctr"/>
+              <a:endParaRPr lang="fr-FR"/>
+            </a:p>
+          </p:txBody>
+        </p:sp>
+        <p:sp>
+          <p:nvSpPr>
+            <p:cNvPr id="97" name="ZoneTexte 96"/>
+            <p:cNvSpPr txBox="1"/>
+            <p:nvPr/>
+          </p:nvSpPr>
+          <p:spPr>
+            <a:xfrm>
+              <a:off x="7339538" y="1106190"/>
+              <a:ext cx="1365374" cy="338554"/>
+            </a:xfrm>
+            <a:prstGeom prst="rect">
+              <a:avLst/>
+            </a:prstGeom>
+            <a:noFill/>
+          </p:spPr>
+          <p:txBody>
+            <a:bodyPr wrap="none" rtlCol="0">
+              <a:spAutoFit/>
+            </a:bodyPr>
+            <a:lstStyle/>
+            <a:p>
+              <a:r>
+                <a:rPr lang="fr-FR" sz="1600" b="1" dirty="0" err="1" smtClean="0"/>
+                <a:t>CodeThread</a:t>
+              </a:r>
+              <a:r>
+                <a:rPr lang="fr-FR" sz="1600" b="1" dirty="0" smtClean="0"/>
+                <a:t> </a:t>
+              </a:r>
+              <a:r>
+                <a:rPr lang="fr-FR" sz="1600" b="1" dirty="0" smtClean="0"/>
+                <a:t>3</a:t>
+              </a:r>
+              <a:endParaRPr lang="fr-FR" sz="1600" b="1" dirty="0"/>
+            </a:p>
+          </p:txBody>
+        </p:sp>
       </p:grpSp>
       <p:sp>
         <p:nvSpPr>
@@ -6775,8 +7045,8 @@
         </p:nvSpPr>
         <p:spPr>
           <a:xfrm>
-            <a:off x="7925983" y="1532098"/>
-            <a:ext cx="2595006" cy="1169551"/>
+            <a:off x="7925983" y="2094073"/>
+            <a:ext cx="2633028" cy="1169551"/>
           </a:xfrm>
           <a:prstGeom prst="rect">
             <a:avLst/>
@@ -6808,62 +7078,59 @@
               <a:t>_code, </a:t>
             </a:r>
             <a:r>
-              <a:rPr lang="fr-FR" sz="1400" dirty="0" smtClean="0">
-                <a:solidFill>
-                  <a:srgbClr val="FF00FF"/>
-                </a:solidFill>
-              </a:rPr>
+              <a:rPr lang="fr-FR" sz="1400" b="1" dirty="0" smtClean="0"/>
               <a:t>_</a:t>
             </a:r>
             <a:r>
+              <a:rPr lang="fr-FR" sz="1400" b="1" dirty="0" err="1" smtClean="0"/>
+              <a:t>resultExpression</a:t>
+            </a:r>
+            <a:r>
+              <a:rPr lang="fr-FR" sz="1400" b="1" dirty="0" smtClean="0"/>
+              <a:t>, _</a:t>
+            </a:r>
+            <a:r>
+              <a:rPr lang="fr-FR" sz="1400" b="1" dirty="0" err="1" smtClean="0"/>
+              <a:t>result</a:t>
+            </a:r>
+            <a:endParaRPr lang="fr-FR" sz="1400" b="1" dirty="0" smtClean="0"/>
+          </a:p>
+          <a:p>
+            <a:r>
+              <a:rPr lang="fr-FR" sz="1400" dirty="0" smtClean="0"/>
+              <a:t>_</a:t>
+            </a:r>
+            <a:r>
+              <a:rPr lang="fr-FR" sz="1400" dirty="0" err="1" smtClean="0"/>
+              <a:t>name</a:t>
+            </a:r>
+            <a:r>
+              <a:rPr lang="fr-FR" sz="1400" dirty="0" smtClean="0"/>
+              <a:t>, </a:t>
+            </a:r>
+          </a:p>
+          <a:p>
+            <a:r>
+              <a:rPr lang="fr-FR" sz="1400" dirty="0">
+                <a:solidFill>
+                  <a:srgbClr val="FF0000"/>
+                </a:solidFill>
+              </a:rPr>
+              <a:t>_</a:t>
+            </a:r>
+            <a:r>
               <a:rPr lang="fr-FR" sz="1400" dirty="0" err="1" smtClean="0">
                 <a:solidFill>
-                  <a:srgbClr val="FF00FF"/>
-                </a:solidFill>
-              </a:rPr>
-              <a:t>resultExpression</a:t>
-            </a:r>
-            <a:r>
-              <a:rPr lang="fr-FR" sz="1400" dirty="0" smtClean="0">
-                <a:solidFill>
-                  <a:srgbClr val="FF00FF"/>
-                </a:solidFill>
-              </a:rPr>
-              <a:t>, _</a:t>
-            </a:r>
-            <a:r>
-              <a:rPr lang="fr-FR" sz="1400" dirty="0" err="1" smtClean="0">
-                <a:solidFill>
-                  <a:srgbClr val="FF00FF"/>
-                </a:solidFill>
-              </a:rPr>
-              <a:t>result</a:t>
+                  <a:srgbClr val="FF0000"/>
+                </a:solidFill>
+              </a:rPr>
+              <a:t>threadCallback</a:t>
             </a:r>
             <a:endParaRPr lang="fr-FR" sz="1400" dirty="0" smtClean="0">
               <a:solidFill>
-                <a:srgbClr val="FF00FF"/>
+                <a:srgbClr val="FF0000"/>
               </a:solidFill>
             </a:endParaRPr>
-          </a:p>
-          <a:p>
-            <a:r>
-              <a:rPr lang="fr-FR" sz="1400" dirty="0" smtClean="0"/>
-              <a:t>_</a:t>
-            </a:r>
-            <a:r>
-              <a:rPr lang="fr-FR" sz="1400" dirty="0" err="1" smtClean="0"/>
-              <a:t>name</a:t>
-            </a:r>
-            <a:r>
-              <a:rPr lang="fr-FR" sz="1400" dirty="0" smtClean="0"/>
-              <a:t>, </a:t>
-            </a:r>
-          </a:p>
-          <a:p>
-            <a:r>
-              <a:rPr lang="fr-FR" sz="1400" dirty="0" smtClean="0"/>
-              <a:t>_callback</a:t>
-            </a:r>
           </a:p>
           <a:p>
             <a:r>
@@ -6894,8 +7161,8 @@
         </p:nvSpPr>
         <p:spPr>
           <a:xfrm>
-            <a:off x="7925983" y="3895789"/>
-            <a:ext cx="3552767" cy="1908215"/>
+            <a:off x="7925983" y="3648139"/>
+            <a:ext cx="3552767" cy="1477328"/>
           </a:xfrm>
           <a:prstGeom prst="rect">
             <a:avLst/>
@@ -6925,11 +7192,7 @@
               <a:t>, </a:t>
             </a:r>
             <a:r>
-              <a:rPr lang="fr-FR" sz="1400" dirty="0" err="1" smtClean="0">
-                <a:solidFill>
-                  <a:srgbClr val="FF00FF"/>
-                </a:solidFill>
-              </a:rPr>
+              <a:rPr lang="fr-FR" sz="1400" b="1" dirty="0" err="1" smtClean="0"/>
               <a:t>resultExpression</a:t>
             </a:r>
             <a:r>
@@ -7019,53 +7282,24 @@
           <a:p>
             <a:r>
               <a:rPr lang="fr-FR" sz="1200" dirty="0" smtClean="0"/>
-              <a:t>   </a:t>
-            </a:r>
-            <a:r>
-              <a:rPr lang="fr-FR" sz="1200" dirty="0" smtClean="0">
-                <a:solidFill>
-                  <a:srgbClr val="FF00FF"/>
-                </a:solidFill>
-              </a:rPr>
-              <a:t>self._</a:t>
-            </a:r>
-            <a:r>
-              <a:rPr lang="fr-FR" sz="1200" dirty="0" err="1" smtClean="0">
-                <a:solidFill>
-                  <a:srgbClr val="FF00FF"/>
-                </a:solidFill>
-              </a:rPr>
+              <a:t>   self._</a:t>
+            </a:r>
+            <a:r>
+              <a:rPr lang="fr-FR" sz="1200" dirty="0" err="1" smtClean="0"/>
               <a:t>result</a:t>
             </a:r>
             <a:r>
               <a:rPr lang="fr-FR" sz="1200" dirty="0" smtClean="0"/>
-              <a:t> </a:t>
-            </a:r>
-            <a:r>
-              <a:rPr lang="fr-FR" sz="1200" dirty="0" smtClean="0">
-                <a:solidFill>
-                  <a:srgbClr val="FF00FF"/>
-                </a:solidFill>
-              </a:rPr>
-              <a:t>= _lv['_</a:t>
-            </a:r>
-            <a:r>
-              <a:rPr lang="fr-FR" sz="1200" dirty="0" err="1" smtClean="0">
-                <a:solidFill>
-                  <a:srgbClr val="FF00FF"/>
-                </a:solidFill>
-              </a:rPr>
+              <a:t> = _lv['_</a:t>
+            </a:r>
+            <a:r>
+              <a:rPr lang="fr-FR" sz="1200" dirty="0" err="1" smtClean="0"/>
               <a:t>resultThread</a:t>
             </a:r>
             <a:r>
-              <a:rPr lang="fr-FR" sz="1200" dirty="0" smtClean="0">
-                <a:solidFill>
-                  <a:srgbClr val="FF00FF"/>
-                </a:solidFill>
-              </a:rPr>
+              <a:rPr lang="fr-FR" sz="1200" dirty="0" smtClean="0"/>
               <a:t>']</a:t>
             </a:r>
-            <a:endParaRPr lang="fr-FR" sz="1200" dirty="0" smtClean="0"/>
           </a:p>
           <a:p>
             <a:r>
@@ -7074,22 +7308,38 @@
             </a:r>
             <a:r>
               <a:rPr lang="fr-FR" sz="1200" dirty="0" smtClean="0"/>
-              <a:t>  _callback(self, </a:t>
-            </a:r>
-            <a:r>
-              <a:rPr lang="fr-FR" sz="1200" dirty="0" smtClean="0">
-                <a:solidFill>
-                  <a:srgbClr val="FF00FF"/>
-                </a:solidFill>
-              </a:rPr>
-              <a:t>self._</a:t>
+              <a:t>  </a:t>
+            </a:r>
+            <a:r>
+              <a:rPr lang="fr-FR" sz="1200" dirty="0">
+                <a:solidFill>
+                  <a:srgbClr val="FF0000"/>
+                </a:solidFill>
+              </a:rPr>
+              <a:t>_</a:t>
             </a:r>
             <a:r>
               <a:rPr lang="fr-FR" sz="1200" dirty="0" err="1" smtClean="0">
                 <a:solidFill>
-                  <a:srgbClr val="FF00FF"/>
-                </a:solidFill>
-              </a:rPr>
+                  <a:srgbClr val="FF0000"/>
+                </a:solidFill>
+              </a:rPr>
+              <a:t>threadCallback</a:t>
+            </a:r>
+            <a:r>
+              <a:rPr lang="fr-FR" sz="1200" dirty="0" smtClean="0"/>
+              <a:t>(self</a:t>
+            </a:r>
+            <a:r>
+              <a:rPr lang="fr-FR" sz="1200" dirty="0" smtClean="0"/>
+              <a:t>, self</a:t>
+            </a:r>
+            <a:r>
+              <a:rPr lang="fr-FR" sz="1200" b="1" dirty="0" smtClean="0"/>
+              <a:t>._</a:t>
+            </a:r>
+            <a:r>
+              <a:rPr lang="fr-FR" sz="1200" b="1" dirty="0" err="1" smtClean="0"/>
               <a:t>result</a:t>
             </a:r>
             <a:r>
@@ -7099,30 +7349,6 @@
           </a:p>
           <a:p>
             <a:endParaRPr lang="fr-FR" sz="1200" dirty="0" smtClean="0"/>
-          </a:p>
-          <a:p>
-            <a:r>
-              <a:rPr lang="fr-FR" sz="1400" dirty="0" err="1" smtClean="0"/>
-              <a:t>isrunning</a:t>
-            </a:r>
-            <a:r>
-              <a:rPr lang="fr-FR" sz="1400" dirty="0" smtClean="0"/>
-              <a:t>()</a:t>
-            </a:r>
-          </a:p>
-          <a:p>
-            <a:r>
-              <a:rPr lang="fr-FR" sz="1400" dirty="0" err="1"/>
-              <a:t>f</a:t>
-            </a:r>
-            <a:r>
-              <a:rPr lang="fr-FR" sz="1400" dirty="0" err="1" smtClean="0"/>
-              <a:t>ailed</a:t>
-            </a:r>
-            <a:r>
-              <a:rPr lang="fr-FR" sz="1400" dirty="0" smtClean="0"/>
-              <a:t>()</a:t>
-            </a:r>
           </a:p>
         </p:txBody>
       </p:sp>
@@ -7134,8 +7360,602 @@
         </p:nvCxnSpPr>
         <p:spPr>
           <a:xfrm flipV="1">
-            <a:off x="5429250" y="1344874"/>
-            <a:ext cx="2497839" cy="2550915"/>
+            <a:off x="7306582" y="2089741"/>
+            <a:ext cx="661167" cy="1987416"/>
+          </a:xfrm>
+          <a:prstGeom prst="straightConnector1">
+            <a:avLst/>
+          </a:prstGeom>
+          <a:ln>
+            <a:solidFill>
+              <a:srgbClr val="FF0000"/>
+            </a:solidFill>
+            <a:tailEnd type="triangle"/>
+          </a:ln>
+        </p:spPr>
+        <p:style>
+          <a:lnRef idx="1">
+            <a:schemeClr val="accent1"/>
+          </a:lnRef>
+          <a:fillRef idx="0">
+            <a:schemeClr val="accent1"/>
+          </a:fillRef>
+          <a:effectRef idx="0">
+            <a:schemeClr val="accent1"/>
+          </a:effectRef>
+          <a:fontRef idx="minor">
+            <a:schemeClr val="tx1"/>
+          </a:fontRef>
+        </p:style>
+      </p:cxnSp>
+      <p:cxnSp>
+        <p:nvCxnSpPr>
+          <p:cNvPr id="63" name="Connecteur droit avec flèche 62"/>
+          <p:cNvCxnSpPr/>
+          <p:nvPr/>
+        </p:nvCxnSpPr>
+        <p:spPr>
+          <a:xfrm flipV="1">
+            <a:off x="7616619" y="3909398"/>
+            <a:ext cx="351130" cy="865791"/>
+          </a:xfrm>
+          <a:prstGeom prst="straightConnector1">
+            <a:avLst/>
+          </a:prstGeom>
+          <a:ln>
+            <a:solidFill>
+              <a:srgbClr val="FF0000"/>
+            </a:solidFill>
+            <a:tailEnd type="triangle"/>
+          </a:ln>
+        </p:spPr>
+        <p:style>
+          <a:lnRef idx="1">
+            <a:schemeClr val="accent1"/>
+          </a:lnRef>
+          <a:fillRef idx="0">
+            <a:schemeClr val="accent1"/>
+          </a:fillRef>
+          <a:effectRef idx="0">
+            <a:schemeClr val="accent1"/>
+          </a:effectRef>
+          <a:fontRef idx="minor">
+            <a:schemeClr val="tx1"/>
+          </a:fontRef>
+        </p:style>
+      </p:cxnSp>
+      <p:cxnSp>
+        <p:nvCxnSpPr>
+          <p:cNvPr id="15" name="Connecteur droit avec flèche 14"/>
+          <p:cNvCxnSpPr>
+            <a:endCxn id="10" idx="1"/>
+          </p:cNvCxnSpPr>
+          <p:nvPr/>
+        </p:nvCxnSpPr>
+        <p:spPr>
+          <a:xfrm>
+            <a:off x="3314700" y="975542"/>
+            <a:ext cx="229682" cy="0"/>
+          </a:xfrm>
+          <a:prstGeom prst="straightConnector1">
+            <a:avLst/>
+          </a:prstGeom>
+          <a:ln>
+            <a:solidFill>
+              <a:srgbClr val="0000FF"/>
+            </a:solidFill>
+            <a:tailEnd type="triangle"/>
+          </a:ln>
+        </p:spPr>
+        <p:style>
+          <a:lnRef idx="1">
+            <a:schemeClr val="accent1"/>
+          </a:lnRef>
+          <a:fillRef idx="0">
+            <a:schemeClr val="accent1"/>
+          </a:fillRef>
+          <a:effectRef idx="0">
+            <a:schemeClr val="accent1"/>
+          </a:effectRef>
+          <a:fontRef idx="minor">
+            <a:schemeClr val="tx1"/>
+          </a:fontRef>
+        </p:style>
+      </p:cxnSp>
+      <p:cxnSp>
+        <p:nvCxnSpPr>
+          <p:cNvPr id="24" name="Connecteur droit 23"/>
+          <p:cNvCxnSpPr/>
+          <p:nvPr/>
+        </p:nvCxnSpPr>
+        <p:spPr>
+          <a:xfrm>
+            <a:off x="3314700" y="966831"/>
+            <a:ext cx="0" cy="252364"/>
+          </a:xfrm>
+          <a:prstGeom prst="line">
+            <a:avLst/>
+          </a:prstGeom>
+          <a:ln>
+            <a:solidFill>
+              <a:srgbClr val="0000FF"/>
+            </a:solidFill>
+          </a:ln>
+        </p:spPr>
+        <p:style>
+          <a:lnRef idx="1">
+            <a:schemeClr val="accent1"/>
+          </a:lnRef>
+          <a:fillRef idx="0">
+            <a:schemeClr val="accent1"/>
+          </a:fillRef>
+          <a:effectRef idx="0">
+            <a:schemeClr val="accent1"/>
+          </a:effectRef>
+          <a:fontRef idx="minor">
+            <a:schemeClr val="tx1"/>
+          </a:fontRef>
+        </p:style>
+      </p:cxnSp>
+      <p:grpSp>
+        <p:nvGrpSpPr>
+          <p:cNvPr id="29" name="Groupe 28"/>
+          <p:cNvGrpSpPr/>
+          <p:nvPr/>
+        </p:nvGrpSpPr>
+        <p:grpSpPr>
+          <a:xfrm>
+            <a:off x="197476" y="3263112"/>
+            <a:ext cx="3157764" cy="1499389"/>
+            <a:chOff x="197476" y="3263112"/>
+            <a:chExt cx="3157764" cy="1499389"/>
+          </a:xfrm>
+        </p:grpSpPr>
+        <p:sp>
+          <p:nvSpPr>
+            <p:cNvPr id="25" name="Rectangle 24"/>
+            <p:cNvSpPr/>
+            <p:nvPr/>
+          </p:nvSpPr>
+          <p:spPr>
+            <a:xfrm>
+              <a:off x="210634" y="3276601"/>
+              <a:ext cx="3144606" cy="1485900"/>
+            </a:xfrm>
+            <a:prstGeom prst="rect">
+              <a:avLst/>
+            </a:prstGeom>
+            <a:noFill/>
+            <a:ln>
+              <a:solidFill>
+                <a:srgbClr val="0000FF"/>
+              </a:solidFill>
+            </a:ln>
+          </p:spPr>
+          <p:style>
+            <a:lnRef idx="2">
+              <a:schemeClr val="accent1">
+                <a:shade val="50000"/>
+              </a:schemeClr>
+            </a:lnRef>
+            <a:fillRef idx="1">
+              <a:schemeClr val="accent1"/>
+            </a:fillRef>
+            <a:effectRef idx="0">
+              <a:schemeClr val="accent1"/>
+            </a:effectRef>
+            <a:fontRef idx="minor">
+              <a:schemeClr val="lt1"/>
+            </a:fontRef>
+          </p:style>
+          <p:txBody>
+            <a:bodyPr rtlCol="0" anchor="ctr"/>
+            <a:lstStyle/>
+            <a:p>
+              <a:pPr algn="ctr"/>
+              <a:endParaRPr lang="fr-FR"/>
+            </a:p>
+          </p:txBody>
+        </p:sp>
+        <p:sp>
+          <p:nvSpPr>
+            <p:cNvPr id="43" name="ZoneTexte 42"/>
+            <p:cNvSpPr txBox="1"/>
+            <p:nvPr/>
+          </p:nvSpPr>
+          <p:spPr>
+            <a:xfrm>
+              <a:off x="218801" y="3263112"/>
+              <a:ext cx="2686633" cy="307777"/>
+            </a:xfrm>
+            <a:prstGeom prst="rect">
+              <a:avLst/>
+            </a:prstGeom>
+            <a:noFill/>
+          </p:spPr>
+          <p:txBody>
+            <a:bodyPr wrap="none" rtlCol="0">
+              <a:spAutoFit/>
+            </a:bodyPr>
+            <a:lstStyle/>
+            <a:p>
+              <a:r>
+                <a:rPr lang="fr-FR" sz="1400" b="1" dirty="0">
+                  <a:solidFill>
+                    <a:srgbClr val="0000FF"/>
+                  </a:solidFill>
+                </a:rPr>
+                <a:t>_</a:t>
+              </a:r>
+              <a:r>
+                <a:rPr lang="fr-FR" sz="1400" b="1" dirty="0" err="1" smtClean="0">
+                  <a:solidFill>
+                    <a:srgbClr val="0000FF"/>
+                  </a:solidFill>
+                </a:rPr>
+                <a:t>callbackQueueManager</a:t>
+              </a:r>
+              <a:r>
+                <a:rPr lang="fr-FR" sz="1400" b="1" dirty="0" smtClean="0">
+                  <a:solidFill>
+                    <a:srgbClr val="0000FF"/>
+                  </a:solidFill>
+                </a:rPr>
+                <a:t> THREAD</a:t>
+              </a:r>
+              <a:endParaRPr lang="fr-FR" sz="1600" b="1" dirty="0">
+                <a:solidFill>
+                  <a:srgbClr val="0000FF"/>
+                </a:solidFill>
+              </a:endParaRPr>
+            </a:p>
+          </p:txBody>
+        </p:sp>
+        <p:sp>
+          <p:nvSpPr>
+            <p:cNvPr id="26" name="Rectangle 25"/>
+            <p:cNvSpPr/>
+            <p:nvPr/>
+          </p:nvSpPr>
+          <p:spPr>
+            <a:xfrm>
+              <a:off x="197476" y="3658165"/>
+              <a:ext cx="3157763" cy="892552"/>
+            </a:xfrm>
+            <a:prstGeom prst="rect">
+              <a:avLst/>
+            </a:prstGeom>
+          </p:spPr>
+          <p:txBody>
+            <a:bodyPr wrap="square">
+              <a:spAutoFit/>
+            </a:bodyPr>
+            <a:lstStyle/>
+            <a:p>
+              <a:r>
+                <a:rPr lang="fr-FR" sz="1400" dirty="0">
+                  <a:solidFill>
+                    <a:srgbClr val="0000FF"/>
+                  </a:solidFill>
+                </a:rPr>
+                <a:t>_</a:t>
+              </a:r>
+              <a:r>
+                <a:rPr lang="fr-FR" sz="1400" dirty="0" err="1">
+                  <a:solidFill>
+                    <a:srgbClr val="0000FF"/>
+                  </a:solidFill>
+                </a:rPr>
+                <a:t>callbackQueueManager</a:t>
+              </a:r>
+              <a:r>
+                <a:rPr lang="fr-FR" sz="1400" dirty="0">
+                  <a:solidFill>
+                    <a:srgbClr val="0000FF"/>
+                  </a:solidFill>
+                </a:rPr>
+                <a:t>()</a:t>
+              </a:r>
+            </a:p>
+            <a:p>
+              <a:r>
+                <a:rPr lang="fr-FR" sz="1400" dirty="0">
+                  <a:solidFill>
+                    <a:srgbClr val="0000FF"/>
+                  </a:solidFill>
+                </a:rPr>
+                <a:t>   </a:t>
+              </a:r>
+              <a:r>
+                <a:rPr lang="fr-FR" sz="1200" dirty="0" err="1">
+                  <a:solidFill>
+                    <a:srgbClr val="0000FF"/>
+                  </a:solidFill>
+                </a:rPr>
+                <a:t>threadId</a:t>
+              </a:r>
+              <a:r>
+                <a:rPr lang="fr-FR" sz="1200" dirty="0">
+                  <a:solidFill>
+                    <a:srgbClr val="0000FF"/>
+                  </a:solidFill>
+                </a:rPr>
+                <a:t>, </a:t>
+              </a:r>
+              <a:r>
+                <a:rPr lang="fr-FR" sz="1200" dirty="0" err="1">
+                  <a:solidFill>
+                    <a:srgbClr val="0000FF"/>
+                  </a:solidFill>
+                </a:rPr>
+                <a:t>failed</a:t>
+              </a:r>
+              <a:r>
+                <a:rPr lang="fr-FR" sz="1200" dirty="0">
+                  <a:solidFill>
+                    <a:srgbClr val="0000FF"/>
+                  </a:solidFill>
+                </a:rPr>
+                <a:t>, </a:t>
+              </a:r>
+              <a:r>
+                <a:rPr lang="fr-FR" sz="1200" b="1" dirty="0" err="1"/>
+                <a:t>result</a:t>
+              </a:r>
+              <a:r>
+                <a:rPr lang="fr-FR" sz="1200" dirty="0"/>
+                <a:t> </a:t>
+              </a:r>
+              <a:r>
+                <a:rPr lang="fr-FR" sz="1200" dirty="0">
+                  <a:solidFill>
+                    <a:srgbClr val="0000FF"/>
+                  </a:solidFill>
+                </a:rPr>
+                <a:t>= _</a:t>
+              </a:r>
+              <a:r>
+                <a:rPr lang="fr-FR" sz="1200" dirty="0" err="1">
+                  <a:solidFill>
+                    <a:srgbClr val="0000FF"/>
+                  </a:solidFill>
+                </a:rPr>
+                <a:t>callbackQueue.get</a:t>
+              </a:r>
+              <a:r>
+                <a:rPr lang="fr-FR" sz="1200" dirty="0">
+                  <a:solidFill>
+                    <a:srgbClr val="0000FF"/>
+                  </a:solidFill>
+                </a:rPr>
+                <a:t>()</a:t>
+              </a:r>
+            </a:p>
+            <a:p>
+              <a:r>
+                <a:rPr lang="en-US" sz="1200" dirty="0">
+                  <a:solidFill>
+                    <a:srgbClr val="0000FF"/>
+                  </a:solidFill>
+                </a:rPr>
+                <a:t>   if </a:t>
+              </a:r>
+              <a:r>
+                <a:rPr lang="en-US" sz="1200" dirty="0" err="1">
+                  <a:solidFill>
+                    <a:srgbClr val="0000FF"/>
+                  </a:solidFill>
+                </a:rPr>
+                <a:t>threadId</a:t>
+              </a:r>
+              <a:r>
+                <a:rPr lang="en-US" sz="1200" dirty="0">
+                  <a:solidFill>
+                    <a:srgbClr val="0000FF"/>
+                  </a:solidFill>
+                </a:rPr>
+                <a:t> in self._</a:t>
+              </a:r>
+              <a:r>
+                <a:rPr lang="en-US" sz="1200" dirty="0" err="1">
+                  <a:solidFill>
+                    <a:srgbClr val="0000FF"/>
+                  </a:solidFill>
+                </a:rPr>
+                <a:t>callbackDict</a:t>
+              </a:r>
+              <a:r>
+                <a:rPr lang="en-US" sz="1200" dirty="0">
+                  <a:solidFill>
+                    <a:srgbClr val="0000FF"/>
+                  </a:solidFill>
+                </a:rPr>
+                <a:t>:</a:t>
+              </a:r>
+            </a:p>
+            <a:p>
+              <a:r>
+                <a:rPr lang="fr-FR" sz="1200" dirty="0">
+                  <a:solidFill>
+                    <a:srgbClr val="0000FF"/>
+                  </a:solidFill>
+                </a:rPr>
+                <a:t>       _</a:t>
+              </a:r>
+              <a:r>
+                <a:rPr lang="fr-FR" sz="1200" dirty="0" err="1">
+                  <a:solidFill>
+                    <a:srgbClr val="0000FF"/>
+                  </a:solidFill>
+                </a:rPr>
+                <a:t>callbackDict</a:t>
+              </a:r>
+              <a:r>
+                <a:rPr lang="fr-FR" sz="1200" dirty="0">
+                  <a:solidFill>
+                    <a:srgbClr val="0000FF"/>
+                  </a:solidFill>
+                </a:rPr>
+                <a:t>[</a:t>
+              </a:r>
+              <a:r>
+                <a:rPr lang="fr-FR" sz="1200" dirty="0" err="1">
+                  <a:solidFill>
+                    <a:srgbClr val="0000FF"/>
+                  </a:solidFill>
+                </a:rPr>
+                <a:t>threadId</a:t>
+              </a:r>
+              <a:r>
+                <a:rPr lang="fr-FR" sz="1200" dirty="0">
+                  <a:solidFill>
+                    <a:srgbClr val="0000FF"/>
+                  </a:solidFill>
+                </a:rPr>
+                <a:t>](</a:t>
+              </a:r>
+              <a:r>
+                <a:rPr lang="fr-FR" sz="1200" dirty="0" err="1">
+                  <a:solidFill>
+                    <a:srgbClr val="0000FF"/>
+                  </a:solidFill>
+                </a:rPr>
+                <a:t>results</a:t>
+              </a:r>
+              <a:r>
+                <a:rPr lang="fr-FR" sz="1200" dirty="0">
+                  <a:solidFill>
+                    <a:srgbClr val="0000FF"/>
+                  </a:solidFill>
+                </a:rPr>
+                <a:t>)</a:t>
+              </a:r>
+            </a:p>
+          </p:txBody>
+        </p:sp>
+      </p:grpSp>
+      <p:cxnSp>
+        <p:nvCxnSpPr>
+          <p:cNvPr id="34" name="Connecteur droit 33"/>
+          <p:cNvCxnSpPr/>
+          <p:nvPr/>
+        </p:nvCxnSpPr>
+        <p:spPr>
+          <a:xfrm flipH="1">
+            <a:off x="6515100" y="4077156"/>
+            <a:ext cx="795654" cy="0"/>
+          </a:xfrm>
+          <a:prstGeom prst="line">
+            <a:avLst/>
+          </a:prstGeom>
+          <a:ln>
+            <a:solidFill>
+              <a:srgbClr val="FF0000"/>
+            </a:solidFill>
+          </a:ln>
+        </p:spPr>
+        <p:style>
+          <a:lnRef idx="1">
+            <a:schemeClr val="accent1"/>
+          </a:lnRef>
+          <a:fillRef idx="0">
+            <a:schemeClr val="accent1"/>
+          </a:fillRef>
+          <a:effectRef idx="0">
+            <a:schemeClr val="accent1"/>
+          </a:effectRef>
+          <a:fontRef idx="minor">
+            <a:schemeClr val="tx1"/>
+          </a:fontRef>
+        </p:style>
+      </p:cxnSp>
+      <p:cxnSp>
+        <p:nvCxnSpPr>
+          <p:cNvPr id="48" name="Connecteur droit 47"/>
+          <p:cNvCxnSpPr/>
+          <p:nvPr/>
+        </p:nvCxnSpPr>
+        <p:spPr>
+          <a:xfrm flipH="1">
+            <a:off x="6848475" y="4762501"/>
+            <a:ext cx="768360" cy="0"/>
+          </a:xfrm>
+          <a:prstGeom prst="line">
+            <a:avLst/>
+          </a:prstGeom>
+          <a:ln>
+            <a:solidFill>
+              <a:srgbClr val="FF0000"/>
+            </a:solidFill>
+          </a:ln>
+        </p:spPr>
+        <p:style>
+          <a:lnRef idx="1">
+            <a:schemeClr val="accent1"/>
+          </a:lnRef>
+          <a:fillRef idx="0">
+            <a:schemeClr val="accent1"/>
+          </a:fillRef>
+          <a:effectRef idx="0">
+            <a:schemeClr val="accent1"/>
+          </a:effectRef>
+          <a:fontRef idx="minor">
+            <a:schemeClr val="tx1"/>
+          </a:fontRef>
+        </p:style>
+      </p:cxnSp>
+      <p:sp>
+        <p:nvSpPr>
+          <p:cNvPr id="46" name="Rectangle 45"/>
+          <p:cNvSpPr/>
+          <p:nvPr/>
+        </p:nvSpPr>
+        <p:spPr>
+          <a:xfrm>
+            <a:off x="8018664" y="5782298"/>
+            <a:ext cx="1020561" cy="523220"/>
+          </a:xfrm>
+          <a:prstGeom prst="rect">
+            <a:avLst/>
+          </a:prstGeom>
+        </p:spPr>
+        <p:txBody>
+          <a:bodyPr wrap="square">
+            <a:spAutoFit/>
+          </a:bodyPr>
+          <a:lstStyle/>
+          <a:p>
+            <a:r>
+              <a:rPr lang="fr-FR" sz="1400" dirty="0" err="1"/>
+              <a:t>isrunning</a:t>
+            </a:r>
+            <a:r>
+              <a:rPr lang="fr-FR" sz="1400" dirty="0"/>
+              <a:t>()</a:t>
+            </a:r>
+          </a:p>
+          <a:p>
+            <a:r>
+              <a:rPr lang="fr-FR" sz="1400" dirty="0" err="1"/>
+              <a:t>failed</a:t>
+            </a:r>
+            <a:r>
+              <a:rPr lang="fr-FR" sz="1400" dirty="0"/>
+              <a:t>()</a:t>
+            </a:r>
+          </a:p>
+        </p:txBody>
+      </p:sp>
+      <p:cxnSp>
+        <p:nvCxnSpPr>
+          <p:cNvPr id="50" name="Connecteur droit avec flèche 49"/>
+          <p:cNvCxnSpPr/>
+          <p:nvPr/>
+        </p:nvCxnSpPr>
+        <p:spPr>
+          <a:xfrm flipH="1">
+            <a:off x="6429375" y="5134992"/>
+            <a:ext cx="1578968" cy="0"/>
           </a:xfrm>
           <a:prstGeom prst="straightConnector1">
             <a:avLst/>
@@ -7164,23 +7984,22 @@
       </p:cxnSp>
       <p:cxnSp>
         <p:nvCxnSpPr>
-          <p:cNvPr id="63" name="Connecteur droit avec flèche 62"/>
+          <p:cNvPr id="52" name="Connecteur droit 51"/>
           <p:cNvCxnSpPr/>
           <p:nvPr/>
         </p:nvCxnSpPr>
         <p:spPr>
-          <a:xfrm flipV="1">
-            <a:off x="6800850" y="4086025"/>
-            <a:ext cx="1126239" cy="676475"/>
+          <a:xfrm flipH="1">
+            <a:off x="8008343" y="4829711"/>
+            <a:ext cx="82360" cy="305281"/>
           </a:xfrm>
-          <a:prstGeom prst="straightConnector1">
+          <a:prstGeom prst="line">
             <a:avLst/>
           </a:prstGeom>
           <a:ln>
             <a:solidFill>
               <a:schemeClr val="tx1"/>
             </a:solidFill>
-            <a:tailEnd type="triangle"/>
           </a:ln>
         </p:spPr>
         <p:style>
@@ -7200,50 +8019,14 @@
       </p:cxnSp>
       <p:cxnSp>
         <p:nvCxnSpPr>
-          <p:cNvPr id="70" name="Connecteur droit avec flèche 69"/>
+          <p:cNvPr id="57" name="Connecteur droit avec flèche 56"/>
           <p:cNvCxnSpPr/>
           <p:nvPr/>
         </p:nvCxnSpPr>
         <p:spPr>
           <a:xfrm flipH="1">
-            <a:off x="5981564" y="5044154"/>
-            <a:ext cx="2086111" cy="258748"/>
-          </a:xfrm>
-          <a:prstGeom prst="straightConnector1">
-            <a:avLst/>
-          </a:prstGeom>
-          <a:ln>
-            <a:solidFill>
-              <a:schemeClr val="tx1"/>
-            </a:solidFill>
-            <a:tailEnd type="triangle"/>
-          </a:ln>
-        </p:spPr>
-        <p:style>
-          <a:lnRef idx="1">
-            <a:schemeClr val="accent1"/>
-          </a:lnRef>
-          <a:fillRef idx="0">
-            <a:schemeClr val="accent1"/>
-          </a:fillRef>
-          <a:effectRef idx="0">
-            <a:schemeClr val="accent1"/>
-          </a:effectRef>
-          <a:fontRef idx="minor">
-            <a:schemeClr val="tx1"/>
-          </a:fontRef>
-        </p:style>
-      </p:cxnSp>
-      <p:cxnSp>
-        <p:nvCxnSpPr>
-          <p:cNvPr id="77" name="Connecteur droit avec flèche 76"/>
-          <p:cNvCxnSpPr/>
-          <p:nvPr/>
-        </p:nvCxnSpPr>
-        <p:spPr>
-          <a:xfrm flipH="1">
-            <a:off x="4543426" y="5584556"/>
-            <a:ext cx="3364612" cy="549544"/>
+            <a:off x="4488738" y="5943085"/>
+            <a:ext cx="3560785" cy="0"/>
           </a:xfrm>
           <a:prstGeom prst="straightConnector1">
             <a:avLst/>
@@ -7271,16 +8054,159 @@
           </a:fontRef>
         </p:style>
       </p:cxnSp>
+      <p:cxnSp>
+        <p:nvCxnSpPr>
+          <p:cNvPr id="67" name="Connecteur droit avec flèche 66"/>
+          <p:cNvCxnSpPr/>
+          <p:nvPr/>
+        </p:nvCxnSpPr>
+        <p:spPr>
+          <a:xfrm flipH="1" flipV="1">
+            <a:off x="2650133" y="4183326"/>
+            <a:ext cx="504264" cy="1160199"/>
+          </a:xfrm>
+          <a:prstGeom prst="straightConnector1">
+            <a:avLst/>
+          </a:prstGeom>
+          <a:ln>
+            <a:solidFill>
+              <a:srgbClr val="FF0000"/>
+            </a:solidFill>
+            <a:tailEnd type="triangle"/>
+          </a:ln>
+        </p:spPr>
+        <p:style>
+          <a:lnRef idx="1">
+            <a:schemeClr val="accent1"/>
+          </a:lnRef>
+          <a:fillRef idx="0">
+            <a:schemeClr val="accent1"/>
+          </a:fillRef>
+          <a:effectRef idx="0">
+            <a:schemeClr val="accent1"/>
+          </a:effectRef>
+          <a:fontRef idx="minor">
+            <a:schemeClr val="tx1"/>
+          </a:fontRef>
+        </p:style>
+      </p:cxnSp>
+      <p:cxnSp>
+        <p:nvCxnSpPr>
+          <p:cNvPr id="73" name="Connecteur droit 72"/>
+          <p:cNvCxnSpPr/>
+          <p:nvPr/>
+        </p:nvCxnSpPr>
+        <p:spPr>
+          <a:xfrm flipH="1">
+            <a:off x="3132484" y="5343525"/>
+            <a:ext cx="671471" cy="0"/>
+          </a:xfrm>
+          <a:prstGeom prst="line">
+            <a:avLst/>
+          </a:prstGeom>
+          <a:ln>
+            <a:solidFill>
+              <a:srgbClr val="FF0000"/>
+            </a:solidFill>
+          </a:ln>
+        </p:spPr>
+        <p:style>
+          <a:lnRef idx="1">
+            <a:schemeClr val="accent1"/>
+          </a:lnRef>
+          <a:fillRef idx="0">
+            <a:schemeClr val="accent1"/>
+          </a:fillRef>
+          <a:effectRef idx="0">
+            <a:schemeClr val="accent1"/>
+          </a:effectRef>
+          <a:fontRef idx="minor">
+            <a:schemeClr val="tx1"/>
+          </a:fontRef>
+        </p:style>
+      </p:cxnSp>
+      <p:cxnSp>
+        <p:nvCxnSpPr>
+          <p:cNvPr id="99" name="Connecteur droit avec flèche 98"/>
+          <p:cNvCxnSpPr/>
+          <p:nvPr/>
+        </p:nvCxnSpPr>
+        <p:spPr>
+          <a:xfrm flipV="1">
+            <a:off x="3198767" y="2294635"/>
+            <a:ext cx="605188" cy="276852"/>
+          </a:xfrm>
+          <a:prstGeom prst="straightConnector1">
+            <a:avLst/>
+          </a:prstGeom>
+          <a:ln>
+            <a:solidFill>
+              <a:srgbClr val="006600"/>
+            </a:solidFill>
+            <a:headEnd type="triangle" w="med" len="med"/>
+            <a:tailEnd type="triangle" w="med" len="med"/>
+          </a:ln>
+        </p:spPr>
+        <p:style>
+          <a:lnRef idx="1">
+            <a:schemeClr val="accent1"/>
+          </a:lnRef>
+          <a:fillRef idx="0">
+            <a:schemeClr val="accent1"/>
+          </a:fillRef>
+          <a:effectRef idx="0">
+            <a:schemeClr val="accent1"/>
+          </a:effectRef>
+          <a:fontRef idx="minor">
+            <a:schemeClr val="tx1"/>
+          </a:fontRef>
+        </p:style>
+      </p:cxnSp>
+      <p:cxnSp>
+        <p:nvCxnSpPr>
+          <p:cNvPr id="102" name="Connecteur droit 101"/>
+          <p:cNvCxnSpPr/>
+          <p:nvPr/>
+        </p:nvCxnSpPr>
+        <p:spPr>
+          <a:xfrm>
+            <a:off x="4637372" y="1232197"/>
+            <a:ext cx="2041729" cy="0"/>
+          </a:xfrm>
+          <a:prstGeom prst="line">
+            <a:avLst/>
+          </a:prstGeom>
+          <a:ln>
+            <a:solidFill>
+              <a:srgbClr val="FF0000"/>
+            </a:solidFill>
+          </a:ln>
+        </p:spPr>
+        <p:style>
+          <a:lnRef idx="1">
+            <a:schemeClr val="accent1"/>
+          </a:lnRef>
+          <a:fillRef idx="0">
+            <a:schemeClr val="accent1"/>
+          </a:fillRef>
+          <a:effectRef idx="0">
+            <a:schemeClr val="accent1"/>
+          </a:effectRef>
+          <a:fontRef idx="minor">
+            <a:schemeClr val="tx1"/>
+          </a:fontRef>
+        </p:style>
+      </p:cxnSp>
       <p:sp>
         <p:nvSpPr>
-          <p:cNvPr id="42" name="ZoneTexte 41"/>
+          <p:cNvPr id="105" name="ZoneTexte 104"/>
           <p:cNvSpPr txBox="1"/>
           <p:nvPr/>
         </p:nvSpPr>
         <p:spPr>
           <a:xfrm>
-            <a:off x="598831" y="3078368"/>
-            <a:ext cx="1988365" cy="307777"/>
+            <a:off x="1066523" y="5699977"/>
+            <a:ext cx="1071127" cy="369332"/>
           </a:xfrm>
           <a:prstGeom prst="rect">
             <a:avLst/>
@@ -7294,18 +8220,10 @@
           <a:lstStyle/>
           <a:p>
             <a:r>
-              <a:rPr lang="fr-FR" sz="1400" dirty="0" smtClean="0">
-                <a:solidFill>
-                  <a:srgbClr val="FF00FF"/>
-                </a:solidFill>
-              </a:rPr>
-              <a:t>Changes by DV July 2016</a:t>
-            </a:r>
-            <a:endParaRPr lang="fr-FR" sz="1200" dirty="0" smtClean="0">
-              <a:solidFill>
-                <a:srgbClr val="FF00FF"/>
-              </a:solidFill>
-            </a:endParaRPr>
+              <a:rPr lang="fr-FR" b="1" smtClean="0"/>
+              <a:t>July 2016</a:t>
+            </a:r>
+            <a:endParaRPr lang="fr-FR" b="1" dirty="0"/>
           </a:p>
         </p:txBody>
       </p:sp>

</xml_diff>